<commit_message>
update during the meeting
</commit_message>
<xml_diff>
--- a/meetings/2016-09-01/OpenC2-Forum_2016-09-01.pptx
+++ b/meetings/2016-09-01/OpenC2-Forum_2016-09-01.pptx
@@ -11,9 +11,9 @@
     <p:sldId id="384" r:id="rId2"/>
     <p:sldId id="415" r:id="rId3"/>
     <p:sldId id="377" r:id="rId4"/>
-    <p:sldId id="410" r:id="rId5"/>
+    <p:sldId id="412" r:id="rId5"/>
     <p:sldId id="411" r:id="rId6"/>
-    <p:sldId id="412" r:id="rId7"/>
+    <p:sldId id="410" r:id="rId7"/>
     <p:sldId id="413" r:id="rId8"/>
     <p:sldId id="417" r:id="rId9"/>
     <p:sldId id="416" r:id="rId10"/>
@@ -119,7 +119,7 @@
   </p:defaultTextStyle>
   <p:extLst>
     <p:ext uri="{EFAFB233-063F-42B5-8137-9DF3F51BA10A}">
-      <p15:sldGuideLst xmlns:p15="http://schemas.microsoft.com/office/powerpoint/2012/main" xmlns="">
+      <p15:sldGuideLst xmlns="" xmlns:p15="http://schemas.microsoft.com/office/powerpoint/2012/main">
         <p15:guide id="1" orient="horz" pos="2160">
           <p15:clr>
             <a:srgbClr val="A4A3A4"/>
@@ -226,7 +226,7 @@
             <a:fld id="{BEA7D905-4A79-4EB8-82BB-49D7A73CDC36}" type="datetimeFigureOut">
               <a:rPr lang="en-US" smtClean="0"/>
               <a:pPr/>
-              <a:t>8/31/2016</a:t>
+              <a:t>9/1/2016</a:t>
             </a:fld>
             <a:endParaRPr lang="en-US" dirty="0"/>
           </a:p>
@@ -731,7 +731,7 @@
             <a:fld id="{FFB301EF-1FA7-4226-9418-EFA7257A8E6C}" type="slidenum">
               <a:rPr lang="en-US" smtClean="0"/>
               <a:pPr/>
-              <a:t>4</a:t>
+              <a:t>6</a:t>
             </a:fld>
             <a:endParaRPr lang="en-US" dirty="0"/>
           </a:p>
@@ -1122,7 +1122,7 @@
             <a:pPr algn="ctr" eaLnBrk="1" latinLnBrk="0" hangingPunct="1"/>
             <a:fld id="{C6ED455F-3E08-499F-8E0F-5341189B0170}" type="datetime1">
               <a:rPr lang="en-US" smtClean="0"/>
-              <a:t>8/31/2016</a:t>
+              <a:t>9/1/2016</a:t>
             </a:fld>
             <a:endParaRPr lang="en-US" sz="2000" dirty="0">
               <a:solidFill>
@@ -1328,7 +1328,7 @@
             <a:pPr eaLnBrk="1" latinLnBrk="0" hangingPunct="1"/>
             <a:fld id="{C2E4AEB7-72D8-4519-8DA9-D33357A33127}" type="datetime1">
               <a:rPr lang="en-US" smtClean="0"/>
-              <a:t>8/31/2016</a:t>
+              <a:t>9/1/2016</a:t>
             </a:fld>
             <a:endParaRPr lang="en-US" dirty="0"/>
           </a:p>
@@ -1510,7 +1510,7 @@
             <a:pPr eaLnBrk="1" latinLnBrk="0" hangingPunct="1"/>
             <a:fld id="{8A4F9B91-60C0-4AEE-9ACE-D9F85CB421F6}" type="datetime1">
               <a:rPr lang="en-US" smtClean="0"/>
-              <a:t>8/31/2016</a:t>
+              <a:t>9/1/2016</a:t>
             </a:fld>
             <a:endParaRPr lang="en-US" dirty="0"/>
           </a:p>
@@ -1775,7 +1775,7 @@
             <a:pPr eaLnBrk="1" latinLnBrk="0" hangingPunct="1"/>
             <a:fld id="{49469A49-075E-4641-85DA-C31DC3449EA3}" type="datetime1">
               <a:rPr lang="en-US" smtClean="0"/>
-              <a:t>8/31/2016</a:t>
+              <a:t>9/1/2016</a:t>
             </a:fld>
             <a:endParaRPr lang="en-US" dirty="0"/>
           </a:p>
@@ -2192,7 +2192,7 @@
             <a:pPr eaLnBrk="1" latinLnBrk="0" hangingPunct="1"/>
             <a:fld id="{903372A4-62A4-4575-80B3-88A065294BCF}" type="datetime1">
               <a:rPr lang="en-US" smtClean="0"/>
-              <a:t>8/31/2016</a:t>
+              <a:t>9/1/2016</a:t>
             </a:fld>
             <a:endParaRPr lang="en-US" dirty="0"/>
           </a:p>
@@ -2441,7 +2441,7 @@
             <a:pPr eaLnBrk="1" latinLnBrk="0" hangingPunct="1"/>
             <a:fld id="{A45C0F5D-77E4-4461-9053-315616257798}" type="datetime1">
               <a:rPr lang="en-US" smtClean="0"/>
-              <a:t>8/31/2016</a:t>
+              <a:t>9/1/2016</a:t>
             </a:fld>
             <a:endParaRPr lang="en-US" dirty="0"/>
           </a:p>
@@ -2680,7 +2680,7 @@
             <a:pPr eaLnBrk="1" latinLnBrk="0" hangingPunct="1"/>
             <a:fld id="{0C487F9F-5B40-481B-BC2B-75035C2E22D2}" type="datetime1">
               <a:rPr lang="en-US" smtClean="0"/>
-              <a:t>8/31/2016</a:t>
+              <a:t>9/1/2016</a:t>
             </a:fld>
             <a:endParaRPr lang="en-US" dirty="0"/>
           </a:p>
@@ -2878,7 +2878,7 @@
             <a:pPr eaLnBrk="1" latinLnBrk="0" hangingPunct="1"/>
             <a:fld id="{0656A751-6E8E-456E-9DD5-36218FC3B95E}" type="datetime1">
               <a:rPr lang="en-US" smtClean="0"/>
-              <a:t>8/31/2016</a:t>
+              <a:t>9/1/2016</a:t>
             </a:fld>
             <a:endParaRPr lang="en-US" dirty="0"/>
           </a:p>
@@ -2982,7 +2982,7 @@
             <a:pPr eaLnBrk="1" latinLnBrk="0" hangingPunct="1"/>
             <a:fld id="{DB401AA3-691D-44C4-8985-3E05E1C1DBD8}" type="datetime1">
               <a:rPr lang="en-US" smtClean="0"/>
-              <a:t>8/31/2016</a:t>
+              <a:t>9/1/2016</a:t>
             </a:fld>
             <a:endParaRPr lang="en-US" dirty="0"/>
           </a:p>
@@ -3124,7 +3124,7 @@
             <a:pPr eaLnBrk="1" latinLnBrk="0" hangingPunct="1"/>
             <a:fld id="{D29D04AF-2087-48EF-B612-92B998D696CC}" type="datetime1">
               <a:rPr lang="en-US" smtClean="0"/>
-              <a:t>8/31/2016</a:t>
+              <a:t>9/1/2016</a:t>
             </a:fld>
             <a:endParaRPr lang="en-US" dirty="0"/>
           </a:p>
@@ -3643,7 +3643,7 @@
             <a:pPr eaLnBrk="1" latinLnBrk="0" hangingPunct="1"/>
             <a:fld id="{9F48350E-EA61-481B-BE9D-18C4D6676A7C}" type="datetime1">
               <a:rPr lang="en-US" smtClean="0"/>
-              <a:t>8/31/2016</a:t>
+              <a:t>9/1/2016</a:t>
             </a:fld>
             <a:endParaRPr lang="en-US" dirty="0"/>
           </a:p>
@@ -3907,7 +3907,7 @@
             <a:pPr eaLnBrk="1" latinLnBrk="0" hangingPunct="1"/>
             <a:fld id="{698A1667-1133-4D18-BCD7-A3F255109458}" type="datetime1">
               <a:rPr lang="en-US" smtClean="0"/>
-              <a:t>8/31/2016</a:t>
+              <a:t>9/1/2016</a:t>
             </a:fld>
             <a:endParaRPr lang="en-US" sz="1400" dirty="0">
               <a:solidFill>
@@ -5244,6 +5244,13 @@
   <p:clrMapOvr>
     <a:masterClrMapping/>
   </p:clrMapOvr>
+  <p:timing>
+    <p:tnLst>
+      <p:par>
+        <p:cTn id="1" dur="indefinite" restart="never" nodeType="tmRoot"/>
+      </p:par>
+    </p:tnLst>
+  </p:timing>
 </p:sld>
 </file>
 
@@ -5347,7 +5354,33 @@
             <a:pPr lvl="1"/>
             <a:r>
               <a:rPr lang="en-US" dirty="0" smtClean="0"/>
-              <a:t>NSA I421 Implementation (TBA, 15 min)</a:t>
+              <a:t>NSA I421 Implementation (TBA, 15 min</a:t>
+            </a:r>
+            <a:r>
+              <a:rPr lang="en-US" dirty="0" smtClean="0"/>
+              <a:t>)</a:t>
+            </a:r>
+          </a:p>
+          <a:p>
+            <a:pPr lvl="1"/>
+            <a:r>
+              <a:rPr lang="en-US" dirty="0" smtClean="0"/>
+              <a:t>Open Discussion (45 min)</a:t>
+            </a:r>
+            <a:endParaRPr lang="en-US" dirty="0" smtClean="0"/>
+          </a:p>
+          <a:p>
+            <a:r>
+              <a:rPr lang="en-US" dirty="0"/>
+              <a:t>Implementation Considerations </a:t>
+            </a:r>
+            <a:r>
+              <a:rPr lang="en-US" dirty="0" smtClean="0"/>
+              <a:t>Task (TBA</a:t>
+            </a:r>
+            <a:r>
+              <a:rPr lang="en-US" dirty="0"/>
+              <a:t>, 30 min)</a:t>
             </a:r>
           </a:p>
           <a:p>
@@ -5414,18 +5447,12 @@
           </a:p>
           <a:p>
             <a:r>
-              <a:rPr lang="en-US" dirty="0" smtClean="0">
-                <a:solidFill>
-                  <a:srgbClr val="FF0000"/>
-                </a:solidFill>
-              </a:rPr>
-              <a:t>Implementation Considerations Working Group (TBA, 30 min)</a:t>
-            </a:r>
-          </a:p>
-          <a:p>
-            <a:r>
               <a:rPr lang="en-US" dirty="0" smtClean="0"/>
-              <a:t>Way Forward for OpenC2 (Brule, 30 min)</a:t>
+              <a:t>Way </a:t>
+            </a:r>
+            <a:r>
+              <a:rPr lang="en-US" dirty="0" smtClean="0"/>
+              <a:t>Forward for OpenC2 (Brule, 30 min)</a:t>
             </a:r>
           </a:p>
           <a:p>
@@ -5522,21 +5549,12 @@
         </p:nvSpPr>
         <p:spPr/>
         <p:txBody>
-          <a:bodyPr>
-            <a:normAutofit fontScale="90000"/>
-          </a:bodyPr>
+          <a:bodyPr/>
           <a:lstStyle/>
           <a:p>
             <a:r>
               <a:rPr lang="en-US" dirty="0" smtClean="0"/>
-              <a:t/>
-            </a:r>
-            <a:br>
-              <a:rPr lang="en-US" dirty="0" smtClean="0"/>
-            </a:br>
-            <a:r>
-              <a:rPr lang="en-US" dirty="0" smtClean="0"/>
-              <a:t>Status</a:t>
+              <a:t>Data Modeling/ STIX</a:t>
             </a:r>
             <a:endParaRPr lang="en-US" dirty="0"/>
           </a:p>
@@ -5544,49 +5562,7 @@
       </p:sp>
       <p:sp>
         <p:nvSpPr>
-          <p:cNvPr id="3" name="Content Placeholder 2"/>
-          <p:cNvSpPr>
-            <a:spLocks noGrp="1"/>
-          </p:cNvSpPr>
-          <p:nvPr>
-            <p:ph idx="1"/>
-          </p:nvPr>
-        </p:nvSpPr>
-        <p:spPr>
-          <a:xfrm>
-            <a:off x="609600" y="1722437"/>
-            <a:ext cx="8229600" cy="4525963"/>
-          </a:xfrm>
-        </p:spPr>
-        <p:txBody>
-          <a:bodyPr/>
-          <a:lstStyle/>
-          <a:p>
-            <a:pPr lvl="1"/>
-            <a:r>
-              <a:rPr lang="en-US" dirty="0" smtClean="0"/>
-              <a:t>Documentation (walk through  of GitHub)</a:t>
-            </a:r>
-          </a:p>
-          <a:p>
-            <a:pPr lvl="1"/>
-            <a:r>
-              <a:rPr lang="en-US" dirty="0" smtClean="0"/>
-              <a:t>Data Modeling </a:t>
-            </a:r>
-          </a:p>
-          <a:p>
-            <a:pPr lvl="1"/>
-            <a:r>
-              <a:rPr lang="en-US" dirty="0" smtClean="0"/>
-              <a:t>Prototype</a:t>
-            </a:r>
-          </a:p>
-        </p:txBody>
-      </p:sp>
-      <p:sp>
-        <p:nvSpPr>
-          <p:cNvPr id="4" name="Slide Number Placeholder 3"/>
+          <p:cNvPr id="3" name="Slide Number Placeholder 2"/>
           <p:cNvSpPr>
             <a:spLocks noGrp="1"/>
           </p:cNvSpPr>
@@ -5614,10 +5590,89 @@
           </a:p>
         </p:txBody>
       </p:sp>
+      <p:sp>
+        <p:nvSpPr>
+          <p:cNvPr id="4" name="Content Placeholder 3"/>
+          <p:cNvSpPr>
+            <a:spLocks noGrp="1"/>
+          </p:cNvSpPr>
+          <p:nvPr>
+            <p:ph sz="quarter" idx="1"/>
+          </p:nvPr>
+        </p:nvSpPr>
+        <p:spPr/>
+        <p:txBody>
+          <a:bodyPr/>
+          <a:lstStyle/>
+          <a:p>
+            <a:r>
+              <a:rPr lang="en-US" dirty="0" smtClean="0"/>
+              <a:t>STIX COA WG</a:t>
+            </a:r>
+          </a:p>
+          <a:p>
+            <a:pPr lvl="1"/>
+            <a:r>
+              <a:rPr lang="en-US" dirty="0" smtClean="0"/>
+              <a:t>OpenC2 to be included in STIX 2.1Jan 2017</a:t>
+            </a:r>
+          </a:p>
+          <a:p>
+            <a:r>
+              <a:rPr lang="en-US" dirty="0" smtClean="0"/>
+              <a:t>Data </a:t>
+            </a:r>
+            <a:r>
+              <a:rPr lang="en-US" dirty="0" smtClean="0"/>
+              <a:t>Modeling</a:t>
+            </a:r>
+          </a:p>
+          <a:p>
+            <a:pPr lvl="1"/>
+            <a:r>
+              <a:rPr lang="en-US" dirty="0" smtClean="0"/>
+              <a:t>Cybox3.0 </a:t>
+            </a:r>
+            <a:r>
+              <a:rPr lang="en-US" dirty="0"/>
+              <a:t>Data Model for OpenC2</a:t>
+            </a:r>
+          </a:p>
+          <a:p>
+            <a:pPr lvl="1"/>
+            <a:r>
+              <a:rPr lang="en-US" dirty="0" smtClean="0"/>
+              <a:t>JSON </a:t>
+            </a:r>
+            <a:r>
+              <a:rPr lang="en-US" dirty="0" smtClean="0"/>
+              <a:t>Schema in process (pending)</a:t>
+            </a:r>
+          </a:p>
+          <a:p>
+            <a:pPr lvl="1"/>
+            <a:r>
+              <a:rPr lang="en-US" dirty="0" smtClean="0"/>
+              <a:t>ASN.1 Model in process (circa Feb. 2017)</a:t>
+            </a:r>
+          </a:p>
+          <a:p>
+            <a:pPr lvl="1"/>
+            <a:r>
+              <a:rPr lang="en-US" dirty="0" smtClean="0"/>
+              <a:t>YANG Model </a:t>
+            </a:r>
+          </a:p>
+          <a:p>
+            <a:pPr lvl="2"/>
+            <a:endParaRPr lang="en-US" dirty="0"/>
+          </a:p>
+        </p:txBody>
+      </p:sp>
     </p:spTree>
     <p:extLst>
       <p:ext uri="{BB962C8B-B14F-4D97-AF65-F5344CB8AC3E}">
-        <p14:creationId xmlns:p14="http://schemas.microsoft.com/office/powerpoint/2010/main" val="2935802920"/>
+        <p14:creationId xmlns:p14="http://schemas.microsoft.com/office/powerpoint/2010/main" val="1508324849"/>
       </p:ext>
     </p:extLst>
   </p:cSld>
@@ -5833,20 +5888,71 @@
         </p:nvSpPr>
         <p:spPr/>
         <p:txBody>
+          <a:bodyPr>
+            <a:normAutofit fontScale="90000"/>
+          </a:bodyPr>
+          <a:lstStyle/>
+          <a:p>
+            <a:r>
+              <a:rPr lang="en-US" dirty="0" smtClean="0"/>
+              <a:t/>
+            </a:r>
+            <a:br>
+              <a:rPr lang="en-US" dirty="0" smtClean="0"/>
+            </a:br>
+            <a:r>
+              <a:rPr lang="en-US" dirty="0" smtClean="0"/>
+              <a:t>Status</a:t>
+            </a:r>
+            <a:endParaRPr lang="en-US" dirty="0"/>
+          </a:p>
+        </p:txBody>
+      </p:sp>
+      <p:sp>
+        <p:nvSpPr>
+          <p:cNvPr id="3" name="Content Placeholder 2"/>
+          <p:cNvSpPr>
+            <a:spLocks noGrp="1"/>
+          </p:cNvSpPr>
+          <p:nvPr>
+            <p:ph idx="1"/>
+          </p:nvPr>
+        </p:nvSpPr>
+        <p:spPr>
+          <a:xfrm>
+            <a:off x="609600" y="1722437"/>
+            <a:ext cx="8229600" cy="4525963"/>
+          </a:xfrm>
+        </p:spPr>
+        <p:txBody>
           <a:bodyPr/>
           <a:lstStyle/>
           <a:p>
+            <a:pPr lvl="1"/>
             <a:r>
               <a:rPr lang="en-US" dirty="0" smtClean="0"/>
-              <a:t>Data Modeling/ STIX</a:t>
-            </a:r>
-            <a:endParaRPr lang="en-US" dirty="0"/>
-          </a:p>
-        </p:txBody>
-      </p:sp>
-      <p:sp>
-        <p:nvSpPr>
-          <p:cNvPr id="3" name="Slide Number Placeholder 2"/>
+              <a:t>Documentation (walk through  of GitHub)</a:t>
+            </a:r>
+          </a:p>
+          <a:p>
+            <a:pPr lvl="1"/>
+            <a:r>
+              <a:rPr lang="en-US" dirty="0" smtClean="0"/>
+              <a:t>Data Modeling </a:t>
+            </a:r>
+          </a:p>
+          <a:p>
+            <a:pPr lvl="1"/>
+            <a:r>
+              <a:rPr lang="en-US" dirty="0" smtClean="0"/>
+              <a:t>Prototype</a:t>
+            </a:r>
+          </a:p>
+        </p:txBody>
+      </p:sp>
+      <p:sp>
+        <p:nvSpPr>
+          <p:cNvPr id="4" name="Slide Number Placeholder 3"/>
           <p:cNvSpPr>
             <a:spLocks noGrp="1"/>
           </p:cNvSpPr>
@@ -5874,84 +5980,10 @@
           </a:p>
         </p:txBody>
       </p:sp>
-      <p:sp>
-        <p:nvSpPr>
-          <p:cNvPr id="4" name="Content Placeholder 3"/>
-          <p:cNvSpPr>
-            <a:spLocks noGrp="1"/>
-          </p:cNvSpPr>
-          <p:nvPr>
-            <p:ph sz="quarter" idx="1"/>
-          </p:nvPr>
-        </p:nvSpPr>
-        <p:spPr/>
-        <p:txBody>
-          <a:bodyPr/>
-          <a:lstStyle/>
-          <a:p>
-            <a:r>
-              <a:rPr lang="en-US" dirty="0" smtClean="0"/>
-              <a:t>STIX COA WG</a:t>
-            </a:r>
-          </a:p>
-          <a:p>
-            <a:pPr lvl="1"/>
-            <a:r>
-              <a:rPr lang="en-US" dirty="0" smtClean="0"/>
-              <a:t>OpenC2 to be included in STIX 2.1Jan 2017</a:t>
-            </a:r>
-          </a:p>
-          <a:p>
-            <a:pPr lvl="1"/>
-            <a:r>
-              <a:rPr lang="en-US" dirty="0" smtClean="0"/>
-              <a:t>Cybox3.0 Data Model for STIX 2.0 Structured COA Field</a:t>
-            </a:r>
-          </a:p>
-          <a:p>
-            <a:r>
-              <a:rPr lang="en-US" dirty="0" smtClean="0"/>
-              <a:t>Data Modeling</a:t>
-            </a:r>
-          </a:p>
-          <a:p>
-            <a:pPr lvl="1"/>
-            <a:r>
-              <a:rPr lang="en-US" dirty="0" smtClean="0"/>
-              <a:t>Flat Data Model</a:t>
-            </a:r>
-          </a:p>
-          <a:p>
-            <a:pPr lvl="2"/>
-            <a:r>
-              <a:rPr lang="en-US" dirty="0" smtClean="0"/>
-              <a:t>JSON Schema in process (pending)</a:t>
-            </a:r>
-          </a:p>
-          <a:p>
-            <a:pPr lvl="2"/>
-            <a:r>
-              <a:rPr lang="en-US" dirty="0" smtClean="0"/>
-              <a:t>ASN.1 Model in process (circa Feb. 2017)</a:t>
-            </a:r>
-          </a:p>
-          <a:p>
-            <a:pPr lvl="1"/>
-            <a:r>
-              <a:rPr lang="en-US" dirty="0" smtClean="0"/>
-              <a:t>YANG Model </a:t>
-            </a:r>
-          </a:p>
-          <a:p>
-            <a:pPr lvl="2"/>
-            <a:endParaRPr lang="en-US" dirty="0"/>
-          </a:p>
-        </p:txBody>
-      </p:sp>
     </p:spTree>
     <p:extLst>
       <p:ext uri="{BB962C8B-B14F-4D97-AF65-F5344CB8AC3E}">
-        <p14:creationId xmlns:p14="http://schemas.microsoft.com/office/powerpoint/2010/main" val="1508324849"/>
+        <p14:creationId xmlns:p14="http://schemas.microsoft.com/office/powerpoint/2010/main" val="2935802920"/>
       </p:ext>
     </p:extLst>
   </p:cSld>

</xml_diff>